<commit_message>
Peer review update 2
</commit_message>
<xml_diff>
--- a/lectures/Peer Review.pptx
+++ b/lectures/Peer Review.pptx
@@ -5,7 +5,7 @@
     <p:sldMasterId id="2147483648" r:id="rId1"/>
   </p:sldMasterIdLst>
   <p:notesMasterIdLst>
-    <p:notesMasterId r:id="rId19"/>
+    <p:notesMasterId r:id="rId20"/>
   </p:notesMasterIdLst>
   <p:sldIdLst>
     <p:sldId id="256" r:id="rId2"/>
@@ -15,16 +15,17 @@
     <p:sldId id="274" r:id="rId6"/>
     <p:sldId id="275" r:id="rId7"/>
     <p:sldId id="276" r:id="rId8"/>
-    <p:sldId id="265" r:id="rId9"/>
-    <p:sldId id="266" r:id="rId10"/>
-    <p:sldId id="267" r:id="rId11"/>
-    <p:sldId id="269" r:id="rId12"/>
-    <p:sldId id="268" r:id="rId13"/>
-    <p:sldId id="270" r:id="rId14"/>
-    <p:sldId id="271" r:id="rId15"/>
-    <p:sldId id="278" r:id="rId16"/>
-    <p:sldId id="272" r:id="rId17"/>
-    <p:sldId id="277" r:id="rId18"/>
+    <p:sldId id="279" r:id="rId9"/>
+    <p:sldId id="265" r:id="rId10"/>
+    <p:sldId id="266" r:id="rId11"/>
+    <p:sldId id="267" r:id="rId12"/>
+    <p:sldId id="269" r:id="rId13"/>
+    <p:sldId id="268" r:id="rId14"/>
+    <p:sldId id="270" r:id="rId15"/>
+    <p:sldId id="271" r:id="rId16"/>
+    <p:sldId id="278" r:id="rId17"/>
+    <p:sldId id="272" r:id="rId18"/>
+    <p:sldId id="277" r:id="rId19"/>
   </p:sldIdLst>
   <p:sldSz cx="9144000" cy="6858000" type="screen4x3"/>
   <p:notesSz cx="6858000" cy="9144000"/>
@@ -3553,7 +3554,107 @@
           <p:cNvPr id="2" name="Title 1">
             <a:extLst>
               <a:ext uri="{FF2B5EF4-FFF2-40B4-BE49-F238E27FC236}">
-                <a16:creationId xmlns:a16="http://schemas.microsoft.com/office/drawing/2014/main" xmlns="" id="{B2315989-EC25-BC46-8665-6F3AB82AAABA}"/>
+                <a16:creationId xmlns="" xmlns:a16="http://schemas.microsoft.com/office/drawing/2014/main" id="{B2315989-EC25-BC46-8665-6F3AB82AAABA}"/>
+              </a:ext>
+            </a:extLst>
+          </p:cNvPr>
+          <p:cNvSpPr>
+            <a:spLocks noGrp="1"/>
+          </p:cNvSpPr>
+          <p:nvPr>
+            <p:ph type="title"/>
+          </p:nvPr>
+        </p:nvSpPr>
+        <p:spPr/>
+        <p:txBody>
+          <a:bodyPr/>
+          <a:lstStyle/>
+          <a:p>
+            <a:r>
+              <a:rPr lang="en-US" dirty="0"/>
+              <a:t>Reviewing a paper</a:t>
+            </a:r>
+          </a:p>
+        </p:txBody>
+      </p:sp>
+      <p:pic>
+        <p:nvPicPr>
+          <p:cNvPr id="5" name="Picture 4">
+            <a:extLst>
+              <a:ext uri="{FF2B5EF4-FFF2-40B4-BE49-F238E27FC236}">
+                <a16:creationId xmlns="" xmlns:a16="http://schemas.microsoft.com/office/drawing/2014/main" id="{95A12A66-02CE-5A40-A32D-4F69AB1BAA98}"/>
+              </a:ext>
+            </a:extLst>
+          </p:cNvPr>
+          <p:cNvPicPr>
+            <a:picLocks noChangeAspect="1"/>
+          </p:cNvPicPr>
+          <p:nvPr/>
+        </p:nvPicPr>
+        <p:blipFill>
+          <a:blip r:embed="rId2">
+            <a:extLst>
+              <a:ext uri="{28A0092B-C50C-407E-A947-70E740481C1C}">
+                <a14:useLocalDpi xmlns:a14="http://schemas.microsoft.com/office/drawing/2010/main" val="0"/>
+              </a:ext>
+            </a:extLst>
+          </a:blip>
+          <a:stretch>
+            <a:fillRect/>
+          </a:stretch>
+        </p:blipFill>
+        <p:spPr>
+          <a:xfrm>
+            <a:off x="-414300" y="1271497"/>
+            <a:ext cx="9972600" cy="5586503"/>
+          </a:xfrm>
+          <a:prstGeom prst="rect">
+            <a:avLst/>
+          </a:prstGeom>
+          <a:solidFill>
+            <a:schemeClr val="bg1">
+              <a:lumMod val="85000"/>
+              <a:lumOff val="15000"/>
+            </a:schemeClr>
+          </a:solidFill>
+        </p:spPr>
+      </p:pic>
+    </p:spTree>
+    <p:extLst>
+      <p:ext uri="{BB962C8B-B14F-4D97-AF65-F5344CB8AC3E}">
+        <p14:creationId xmlns:p14="http://schemas.microsoft.com/office/powerpoint/2010/main" val="1878124213"/>
+      </p:ext>
+    </p:extLst>
+  </p:cSld>
+  <p:clrMapOvr>
+    <a:masterClrMapping/>
+  </p:clrMapOvr>
+</p:sld>
+</file>
+
+<file path=ppt/slides/slide11.xml><?xml version="1.0" encoding="utf-8"?>
+<p:sld xmlns:a="http://schemas.openxmlformats.org/drawingml/2006/main" xmlns:r="http://schemas.openxmlformats.org/officeDocument/2006/relationships" xmlns:p="http://schemas.openxmlformats.org/presentationml/2006/main">
+  <p:cSld>
+    <p:spTree>
+      <p:nvGrpSpPr>
+        <p:cNvPr id="1" name=""/>
+        <p:cNvGrpSpPr/>
+        <p:nvPr/>
+      </p:nvGrpSpPr>
+      <p:grpSpPr>
+        <a:xfrm>
+          <a:off x="0" y="0"/>
+          <a:ext cx="0" cy="0"/>
+          <a:chOff x="0" y="0"/>
+          <a:chExt cx="0" cy="0"/>
+        </a:xfrm>
+      </p:grpSpPr>
+      <p:sp>
+        <p:nvSpPr>
+          <p:cNvPr id="2" name="Title 1">
+            <a:extLst>
+              <a:ext uri="{FF2B5EF4-FFF2-40B4-BE49-F238E27FC236}">
+                <a16:creationId xmlns="" xmlns:a16="http://schemas.microsoft.com/office/drawing/2014/main" id="{B2315989-EC25-BC46-8665-6F3AB82AAABA}"/>
               </a:ext>
             </a:extLst>
           </p:cNvPr>
@@ -3581,7 +3682,7 @@
           <p:cNvPr id="4" name="Picture 3">
             <a:extLst>
               <a:ext uri="{FF2B5EF4-FFF2-40B4-BE49-F238E27FC236}">
-                <a16:creationId xmlns:a16="http://schemas.microsoft.com/office/drawing/2014/main" xmlns="" id="{6321BE5C-0B0B-864B-9EB4-F243FA9148A7}"/>
+                <a16:creationId xmlns="" xmlns:a16="http://schemas.microsoft.com/office/drawing/2014/main" id="{6321BE5C-0B0B-864B-9EB4-F243FA9148A7}"/>
               </a:ext>
             </a:extLst>
           </p:cNvPr>
@@ -3631,7 +3732,7 @@
 </p:sld>
 </file>
 
-<file path=ppt/slides/slide11.xml><?xml version="1.0" encoding="utf-8"?>
+<file path=ppt/slides/slide12.xml><?xml version="1.0" encoding="utf-8"?>
 <p:sld xmlns:a="http://schemas.openxmlformats.org/drawingml/2006/main" xmlns:r="http://schemas.openxmlformats.org/officeDocument/2006/relationships" xmlns:p="http://schemas.openxmlformats.org/presentationml/2006/main">
   <p:cSld>
     <p:spTree>
@@ -3653,7 +3754,7 @@
           <p:cNvPr id="2" name="Title 1">
             <a:extLst>
               <a:ext uri="{FF2B5EF4-FFF2-40B4-BE49-F238E27FC236}">
-                <a16:creationId xmlns:a16="http://schemas.microsoft.com/office/drawing/2014/main" xmlns="" id="{B2315989-EC25-BC46-8665-6F3AB82AAABA}"/>
+                <a16:creationId xmlns="" xmlns:a16="http://schemas.microsoft.com/office/drawing/2014/main" id="{B2315989-EC25-BC46-8665-6F3AB82AAABA}"/>
               </a:ext>
             </a:extLst>
           </p:cNvPr>
@@ -3681,7 +3782,7 @@
           <p:cNvPr id="5" name="Picture 4">
             <a:extLst>
               <a:ext uri="{FF2B5EF4-FFF2-40B4-BE49-F238E27FC236}">
-                <a16:creationId xmlns:a16="http://schemas.microsoft.com/office/drawing/2014/main" xmlns="" id="{1EA6B3C9-6663-6048-B19F-322A929A1B0E}"/>
+                <a16:creationId xmlns="" xmlns:a16="http://schemas.microsoft.com/office/drawing/2014/main" id="{1EA6B3C9-6663-6048-B19F-322A929A1B0E}"/>
               </a:ext>
             </a:extLst>
           </p:cNvPr>
@@ -3731,131 +3832,6 @@
 </p:sld>
 </file>
 
-<file path=ppt/slides/slide12.xml><?xml version="1.0" encoding="utf-8"?>
-<p:sld xmlns:a="http://schemas.openxmlformats.org/drawingml/2006/main" xmlns:r="http://schemas.openxmlformats.org/officeDocument/2006/relationships" xmlns:p="http://schemas.openxmlformats.org/presentationml/2006/main">
-  <p:cSld>
-    <p:spTree>
-      <p:nvGrpSpPr>
-        <p:cNvPr id="1" name=""/>
-        <p:cNvGrpSpPr/>
-        <p:nvPr/>
-      </p:nvGrpSpPr>
-      <p:grpSpPr>
-        <a:xfrm>
-          <a:off x="0" y="0"/>
-          <a:ext cx="0" cy="0"/>
-          <a:chOff x="0" y="0"/>
-          <a:chExt cx="0" cy="0"/>
-        </a:xfrm>
-      </p:grpSpPr>
-      <p:sp>
-        <p:nvSpPr>
-          <p:cNvPr id="2" name="Title 1">
-            <a:extLst>
-              <a:ext uri="{FF2B5EF4-FFF2-40B4-BE49-F238E27FC236}">
-                <a16:creationId xmlns:a16="http://schemas.microsoft.com/office/drawing/2014/main" xmlns="" id="{AF6D0803-635C-2B41-BC0F-78432AFFE96B}"/>
-              </a:ext>
-            </a:extLst>
-          </p:cNvPr>
-          <p:cNvSpPr>
-            <a:spLocks noGrp="1"/>
-          </p:cNvSpPr>
-          <p:nvPr>
-            <p:ph type="title"/>
-          </p:nvPr>
-        </p:nvSpPr>
-        <p:spPr/>
-        <p:txBody>
-          <a:bodyPr/>
-          <a:lstStyle/>
-          <a:p>
-            <a:r>
-              <a:rPr lang="en-US" dirty="0"/>
-              <a:t>Reviewing a paper</a:t>
-            </a:r>
-          </a:p>
-        </p:txBody>
-      </p:sp>
-      <p:sp>
-        <p:nvSpPr>
-          <p:cNvPr id="3" name="Content Placeholder 2">
-            <a:extLst>
-              <a:ext uri="{FF2B5EF4-FFF2-40B4-BE49-F238E27FC236}">
-                <a16:creationId xmlns:a16="http://schemas.microsoft.com/office/drawing/2014/main" xmlns="" id="{A6FFC659-F1F6-E743-8499-E0B134A6A49F}"/>
-              </a:ext>
-            </a:extLst>
-          </p:cNvPr>
-          <p:cNvSpPr>
-            <a:spLocks noGrp="1"/>
-          </p:cNvSpPr>
-          <p:nvPr>
-            <p:ph idx="1"/>
-          </p:nvPr>
-        </p:nvSpPr>
-        <p:spPr/>
-        <p:txBody>
-          <a:bodyPr/>
-          <a:lstStyle/>
-          <a:p>
-            <a:r>
-              <a:rPr lang="en-US" dirty="0"/>
-              <a:t>Other considerations:</a:t>
-            </a:r>
-          </a:p>
-          <a:p>
-            <a:pPr lvl="1"/>
-            <a:r>
-              <a:rPr lang="en-US" dirty="0"/>
-              <a:t>Are results replicable?</a:t>
-            </a:r>
-          </a:p>
-          <a:p>
-            <a:pPr lvl="1"/>
-            <a:r>
-              <a:rPr lang="en-US" dirty="0"/>
-              <a:t>Is data / source code available?</a:t>
-            </a:r>
-          </a:p>
-          <a:p>
-            <a:pPr lvl="1"/>
-            <a:r>
-              <a:rPr lang="en-US" dirty="0"/>
-              <a:t>Are all figures/tables understandable and readable</a:t>
-            </a:r>
-          </a:p>
-          <a:p>
-            <a:pPr lvl="1"/>
-            <a:r>
-              <a:rPr lang="en-US" dirty="0"/>
-              <a:t>Is the paper free of grammatical mistakes / typos</a:t>
-            </a:r>
-          </a:p>
-          <a:p>
-            <a:pPr lvl="1"/>
-            <a:r>
-              <a:rPr lang="en-US" dirty="0"/>
-              <a:t>Any other ways to improve the paper?</a:t>
-            </a:r>
-          </a:p>
-          <a:p>
-            <a:pPr lvl="1"/>
-            <a:endParaRPr lang="en-US" dirty="0"/>
-          </a:p>
-        </p:txBody>
-      </p:sp>
-    </p:spTree>
-    <p:extLst>
-      <p:ext uri="{BB962C8B-B14F-4D97-AF65-F5344CB8AC3E}">
-        <p14:creationId xmlns:p14="http://schemas.microsoft.com/office/powerpoint/2010/main" val="31965408"/>
-      </p:ext>
-    </p:extLst>
-  </p:cSld>
-  <p:clrMapOvr>
-    <a:masterClrMapping/>
-  </p:clrMapOvr>
-</p:sld>
-</file>
-
 <file path=ppt/slides/slide13.xml><?xml version="1.0" encoding="utf-8"?>
 <p:sld xmlns:a="http://schemas.openxmlformats.org/drawingml/2006/main" xmlns:r="http://schemas.openxmlformats.org/officeDocument/2006/relationships" xmlns:p="http://schemas.openxmlformats.org/presentationml/2006/main">
   <p:cSld>
@@ -3878,7 +3854,7 @@
           <p:cNvPr id="2" name="Title 1">
             <a:extLst>
               <a:ext uri="{FF2B5EF4-FFF2-40B4-BE49-F238E27FC236}">
-                <a16:creationId xmlns:a16="http://schemas.microsoft.com/office/drawing/2014/main" xmlns="" id="{05D345EE-1171-634E-B7E3-BA3ACEA59116}"/>
+                <a16:creationId xmlns="" xmlns:a16="http://schemas.microsoft.com/office/drawing/2014/main" id="{AF6D0803-635C-2B41-BC0F-78432AFFE96B}"/>
               </a:ext>
             </a:extLst>
           </p:cNvPr>
@@ -3906,7 +3882,7 @@
           <p:cNvPr id="3" name="Content Placeholder 2">
             <a:extLst>
               <a:ext uri="{FF2B5EF4-FFF2-40B4-BE49-F238E27FC236}">
-                <a16:creationId xmlns:a16="http://schemas.microsoft.com/office/drawing/2014/main" xmlns="" id="{57567907-341A-C241-86F2-90F002212C83}"/>
+                <a16:creationId xmlns="" xmlns:a16="http://schemas.microsoft.com/office/drawing/2014/main" id="{A6FFC659-F1F6-E743-8499-E0B134A6A49F}"/>
               </a:ext>
             </a:extLst>
           </p:cNvPr>
@@ -3917,94 +3893,61 @@
             <p:ph idx="1"/>
           </p:nvPr>
         </p:nvSpPr>
-        <p:spPr>
-          <a:xfrm>
-            <a:off x="457200" y="1600200"/>
-            <a:ext cx="8229600" cy="4781128"/>
-          </a:xfrm>
-        </p:spPr>
-        <p:txBody>
-          <a:bodyPr>
-            <a:normAutofit fontScale="85000" lnSpcReduction="10000"/>
-          </a:bodyPr>
-          <a:lstStyle/>
-          <a:p>
-            <a:r>
-              <a:rPr lang="en-US" dirty="0"/>
-              <a:t>Ethical considerations</a:t>
-            </a:r>
-          </a:p>
-          <a:p>
-            <a:pPr lvl="1"/>
-            <a:r>
-              <a:rPr lang="en-US" dirty="0"/>
-              <a:t>Expertise: does the paper fall within your area of expertise?</a:t>
-            </a:r>
-          </a:p>
-          <a:p>
-            <a:pPr lvl="1"/>
-            <a:r>
-              <a:rPr lang="en-US" dirty="0"/>
-              <a:t>Time: dedicate </a:t>
-            </a:r>
-            <a:r>
-              <a:rPr lang="en-US" i="1" dirty="0"/>
-              <a:t>time</a:t>
-            </a:r>
-            <a:r>
-              <a:rPr lang="en-US" dirty="0"/>
-              <a:t> and return review </a:t>
-            </a:r>
-            <a:r>
-              <a:rPr lang="en-US" i="1" dirty="0"/>
-              <a:t>on time</a:t>
-            </a:r>
-            <a:r>
-              <a:rPr lang="en-US" dirty="0"/>
-              <a:t>.</a:t>
-            </a:r>
-          </a:p>
-          <a:p>
-            <a:pPr lvl="1"/>
-            <a:r>
-              <a:rPr lang="en-US" dirty="0"/>
-              <a:t>Rigorousness: do a thorough review for the sake of the authors, conference/journal and the scientific field.</a:t>
-            </a:r>
-          </a:p>
-          <a:p>
-            <a:pPr lvl="1"/>
-            <a:r>
-              <a:rPr lang="en-US" dirty="0"/>
-              <a:t>Watch conflict of interests (either positive or negative bias)</a:t>
-            </a:r>
-          </a:p>
-          <a:p>
-            <a:pPr lvl="1"/>
-            <a:r>
-              <a:rPr lang="en-US" dirty="0"/>
-              <a:t>No intimidation: Your review counts the same as the one from a senior academic. Also if (s)he is an author!</a:t>
-            </a:r>
-          </a:p>
-          <a:p>
-            <a:pPr lvl="1"/>
-            <a:r>
-              <a:rPr lang="en-US" dirty="0"/>
-              <a:t>You can sign your review!</a:t>
-            </a:r>
-          </a:p>
-          <a:p>
-            <a:pPr lvl="1"/>
-            <a:r>
-              <a:rPr lang="en-US" dirty="0"/>
-              <a:t>Respect confidentiality – the manuscript is for your eyes only!</a:t>
-            </a:r>
+        <p:spPr/>
+        <p:txBody>
+          <a:bodyPr/>
+          <a:lstStyle/>
+          <a:p>
+            <a:r>
+              <a:rPr lang="en-US" dirty="0"/>
+              <a:t>Other considerations:</a:t>
+            </a:r>
+          </a:p>
+          <a:p>
+            <a:pPr lvl="1"/>
+            <a:r>
+              <a:rPr lang="en-US" dirty="0"/>
+              <a:t>Are results replicable?</a:t>
+            </a:r>
+          </a:p>
+          <a:p>
+            <a:pPr lvl="1"/>
+            <a:r>
+              <a:rPr lang="en-US" dirty="0"/>
+              <a:t>Is data / source code available?</a:t>
+            </a:r>
+          </a:p>
+          <a:p>
+            <a:pPr lvl="1"/>
+            <a:r>
+              <a:rPr lang="en-US" dirty="0"/>
+              <a:t>Are all figures/tables understandable and readable</a:t>
+            </a:r>
+          </a:p>
+          <a:p>
+            <a:pPr lvl="1"/>
+            <a:r>
+              <a:rPr lang="en-US" dirty="0"/>
+              <a:t>Is the paper free of grammatical mistakes / typos</a:t>
+            </a:r>
+          </a:p>
+          <a:p>
+            <a:pPr lvl="1"/>
+            <a:r>
+              <a:rPr lang="en-US" dirty="0"/>
+              <a:t>Any other ways to improve the paper?</a:t>
+            </a:r>
+          </a:p>
+          <a:p>
+            <a:pPr lvl="1"/>
+            <a:endParaRPr lang="en-US" dirty="0"/>
           </a:p>
         </p:txBody>
       </p:sp>
     </p:spTree>
     <p:extLst>
       <p:ext uri="{BB962C8B-B14F-4D97-AF65-F5344CB8AC3E}">
-        <p14:creationId xmlns:p14="http://schemas.microsoft.com/office/powerpoint/2010/main" val="2128486050"/>
+        <p14:creationId xmlns:p14="http://schemas.microsoft.com/office/powerpoint/2010/main" val="31965408"/>
       </p:ext>
     </p:extLst>
   </p:cSld>
@@ -4036,7 +3979,7 @@
           <p:cNvPr id="2" name="Title 1">
             <a:extLst>
               <a:ext uri="{FF2B5EF4-FFF2-40B4-BE49-F238E27FC236}">
-                <a16:creationId xmlns:a16="http://schemas.microsoft.com/office/drawing/2014/main" xmlns="" id="{15E00A2A-5BC8-8A4F-A076-12F12A5CF1DC}"/>
+                <a16:creationId xmlns="" xmlns:a16="http://schemas.microsoft.com/office/drawing/2014/main" id="{05D345EE-1171-634E-B7E3-BA3ACEA59116}"/>
               </a:ext>
             </a:extLst>
           </p:cNvPr>
@@ -4064,7 +4007,7 @@
           <p:cNvPr id="3" name="Content Placeholder 2">
             <a:extLst>
               <a:ext uri="{FF2B5EF4-FFF2-40B4-BE49-F238E27FC236}">
-                <a16:creationId xmlns:a16="http://schemas.microsoft.com/office/drawing/2014/main" xmlns="" id="{09D8575D-AB89-8A4F-BEC7-D66FE091AC3B}"/>
+                <a16:creationId xmlns="" xmlns:a16="http://schemas.microsoft.com/office/drawing/2014/main" id="{57567907-341A-C241-86F2-90F002212C83}"/>
               </a:ext>
             </a:extLst>
           </p:cNvPr>
@@ -4075,72 +4018,86 @@
             <p:ph idx="1"/>
           </p:nvPr>
         </p:nvSpPr>
-        <p:spPr/>
+        <p:spPr>
+          <a:xfrm>
+            <a:off x="457200" y="1600200"/>
+            <a:ext cx="8229600" cy="4781128"/>
+          </a:xfrm>
+        </p:spPr>
         <p:txBody>
           <a:bodyPr>
-            <a:normAutofit fontScale="85000" lnSpcReduction="20000"/>
+            <a:normAutofit fontScale="85000" lnSpcReduction="10000"/>
           </a:bodyPr>
           <a:lstStyle/>
           <a:p>
             <a:r>
               <a:rPr lang="en-US" dirty="0"/>
-              <a:t>And more qualities!</a:t>
-            </a:r>
-          </a:p>
-          <a:p>
-            <a:pPr lvl="1"/>
-            <a:r>
-              <a:rPr lang="en-US" dirty="0"/>
-              <a:t>Correctness: results and proofs must be correct</a:t>
-            </a:r>
-          </a:p>
-          <a:p>
-            <a:pPr lvl="1"/>
-            <a:r>
-              <a:rPr lang="en-US" dirty="0"/>
-              <a:t>Significance: results and problems are not trivial</a:t>
-            </a:r>
-          </a:p>
-          <a:p>
-            <a:pPr lvl="1"/>
-            <a:r>
-              <a:rPr lang="en-US" dirty="0"/>
-              <a:t>Innovation: study is original and not trivial extensions</a:t>
-            </a:r>
-          </a:p>
-          <a:p>
-            <a:pPr lvl="1"/>
-            <a:r>
-              <a:rPr lang="en-US" dirty="0"/>
-              <a:t>Motivation: study should be relevant to the community</a:t>
-            </a:r>
-          </a:p>
-          <a:p>
-            <a:pPr lvl="1"/>
-            <a:r>
-              <a:rPr lang="en-US" dirty="0"/>
-              <a:t>Timeliness: work contextualized in recent and/or relevant literature</a:t>
-            </a:r>
-          </a:p>
-          <a:p>
-            <a:pPr lvl="1"/>
-            <a:r>
-              <a:rPr lang="en-US" dirty="0"/>
-              <a:t>Succinctness: the paper should be concise and to the point, avoiding obfuscation, jargon and digression</a:t>
-            </a:r>
-          </a:p>
-          <a:p>
-            <a:pPr lvl="1"/>
-            <a:r>
-              <a:rPr lang="en-US" dirty="0"/>
-              <a:t>Accessibility: standard notation and (relatively basic) method explanations should be present</a:t>
-            </a:r>
-          </a:p>
-          <a:p>
-            <a:pPr lvl="1"/>
-            <a:r>
-              <a:rPr lang="en-US" dirty="0"/>
-              <a:t>Readability: the paper should be easy to read with minimum effort</a:t>
+              <a:t>Ethical considerations</a:t>
+            </a:r>
+          </a:p>
+          <a:p>
+            <a:pPr lvl="1"/>
+            <a:r>
+              <a:rPr lang="en-US" dirty="0"/>
+              <a:t>Expertise: does the paper fall within your area of expertise?</a:t>
+            </a:r>
+          </a:p>
+          <a:p>
+            <a:pPr lvl="1"/>
+            <a:r>
+              <a:rPr lang="en-US" dirty="0"/>
+              <a:t>Time: dedicate </a:t>
+            </a:r>
+            <a:r>
+              <a:rPr lang="en-US" i="1" dirty="0"/>
+              <a:t>time</a:t>
+            </a:r>
+            <a:r>
+              <a:rPr lang="en-US" dirty="0"/>
+              <a:t> and return review </a:t>
+            </a:r>
+            <a:r>
+              <a:rPr lang="en-US" i="1" dirty="0"/>
+              <a:t>on time</a:t>
+            </a:r>
+            <a:r>
+              <a:rPr lang="en-US" dirty="0"/>
+              <a:t>.</a:t>
+            </a:r>
+          </a:p>
+          <a:p>
+            <a:pPr lvl="1"/>
+            <a:r>
+              <a:rPr lang="en-US" dirty="0"/>
+              <a:t>Rigorousness: do a thorough review for the sake of the authors, conference/journal and the scientific field.</a:t>
+            </a:r>
+          </a:p>
+          <a:p>
+            <a:pPr lvl="1"/>
+            <a:r>
+              <a:rPr lang="en-US" dirty="0"/>
+              <a:t>Watch conflict of interests (either positive or negative bias)</a:t>
+            </a:r>
+          </a:p>
+          <a:p>
+            <a:pPr lvl="1"/>
+            <a:r>
+              <a:rPr lang="en-US" dirty="0"/>
+              <a:t>No intimidation: Your review counts the same as the one from a senior academic. Also if (s)he is an author!</a:t>
+            </a:r>
+          </a:p>
+          <a:p>
+            <a:pPr lvl="1"/>
+            <a:r>
+              <a:rPr lang="en-US" dirty="0"/>
+              <a:t>You can sign your review!</a:t>
+            </a:r>
+          </a:p>
+          <a:p>
+            <a:pPr lvl="1"/>
+            <a:r>
+              <a:rPr lang="en-US" dirty="0"/>
+              <a:t>Respect confidentiality – the manuscript is for your eyes only!</a:t>
             </a:r>
           </a:p>
         </p:txBody>
@@ -4148,7 +4105,7 @@
     </p:spTree>
     <p:extLst>
       <p:ext uri="{BB962C8B-B14F-4D97-AF65-F5344CB8AC3E}">
-        <p14:creationId xmlns:p14="http://schemas.microsoft.com/office/powerpoint/2010/main" val="2932871023"/>
+        <p14:creationId xmlns:p14="http://schemas.microsoft.com/office/powerpoint/2010/main" val="2128486050"/>
       </p:ext>
     </p:extLst>
   </p:cSld>
@@ -4180,7 +4137,7 @@
           <p:cNvPr id="2" name="Title 1">
             <a:extLst>
               <a:ext uri="{FF2B5EF4-FFF2-40B4-BE49-F238E27FC236}">
-                <a16:creationId xmlns:a16="http://schemas.microsoft.com/office/drawing/2014/main" xmlns="" id="{932DCD78-F968-4D4D-A069-3CA872C2FD05}"/>
+                <a16:creationId xmlns="" xmlns:a16="http://schemas.microsoft.com/office/drawing/2014/main" id="{15E00A2A-5BC8-8A4F-A076-12F12A5CF1DC}"/>
               </a:ext>
             </a:extLst>
           </p:cNvPr>
@@ -4208,7 +4165,7 @@
           <p:cNvPr id="3" name="Content Placeholder 2">
             <a:extLst>
               <a:ext uri="{FF2B5EF4-FFF2-40B4-BE49-F238E27FC236}">
-                <a16:creationId xmlns:a16="http://schemas.microsoft.com/office/drawing/2014/main" xmlns="" id="{F3ECCF9F-E3A2-BD48-92ED-9DB8D5A3E5E8}"/>
+                <a16:creationId xmlns="" xmlns:a16="http://schemas.microsoft.com/office/drawing/2014/main" id="{09D8575D-AB89-8A4F-BEC7-D66FE091AC3B}"/>
               </a:ext>
             </a:extLst>
           </p:cNvPr>
@@ -4221,26 +4178,70 @@
         </p:nvSpPr>
         <p:spPr/>
         <p:txBody>
-          <a:bodyPr/>
-          <a:lstStyle/>
-          <a:p>
-            <a:r>
-              <a:rPr lang="en-US" dirty="0"/>
-              <a:t>Sometimes reviewing goes wrong…</a:t>
-            </a:r>
-          </a:p>
-          <a:p>
-            <a:pPr lvl="1"/>
-            <a:r>
-              <a:rPr lang="en-US" dirty="0"/>
-              <a:t>Reviewer clearly didn’t understand the paper</a:t>
-            </a:r>
-          </a:p>
-          <a:p>
-            <a:pPr lvl="1"/>
-            <a:r>
-              <a:rPr lang="en-US" dirty="0"/>
-              <a:t>Reviews are too short</a:t>
+          <a:bodyPr>
+            <a:normAutofit fontScale="85000" lnSpcReduction="20000"/>
+          </a:bodyPr>
+          <a:lstStyle/>
+          <a:p>
+            <a:r>
+              <a:rPr lang="en-US" dirty="0"/>
+              <a:t>And more qualities!</a:t>
+            </a:r>
+          </a:p>
+          <a:p>
+            <a:pPr lvl="1"/>
+            <a:r>
+              <a:rPr lang="en-US" dirty="0"/>
+              <a:t>Correctness: results and proofs must be correct</a:t>
+            </a:r>
+          </a:p>
+          <a:p>
+            <a:pPr lvl="1"/>
+            <a:r>
+              <a:rPr lang="en-US" dirty="0"/>
+              <a:t>Significance: results and problems are not trivial</a:t>
+            </a:r>
+          </a:p>
+          <a:p>
+            <a:pPr lvl="1"/>
+            <a:r>
+              <a:rPr lang="en-US" dirty="0"/>
+              <a:t>Innovation: study is original and not trivial extensions</a:t>
+            </a:r>
+          </a:p>
+          <a:p>
+            <a:pPr lvl="1"/>
+            <a:r>
+              <a:rPr lang="en-US" dirty="0"/>
+              <a:t>Motivation: study should be relevant to the community</a:t>
+            </a:r>
+          </a:p>
+          <a:p>
+            <a:pPr lvl="1"/>
+            <a:r>
+              <a:rPr lang="en-US" dirty="0"/>
+              <a:t>Timeliness: work contextualized in recent and/or relevant literature</a:t>
+            </a:r>
+          </a:p>
+          <a:p>
+            <a:pPr lvl="1"/>
+            <a:r>
+              <a:rPr lang="en-US" dirty="0"/>
+              <a:t>Succinctness: the paper should be concise and to the point, avoiding obfuscation, jargon and digression</a:t>
+            </a:r>
+          </a:p>
+          <a:p>
+            <a:pPr lvl="1"/>
+            <a:r>
+              <a:rPr lang="en-US" dirty="0"/>
+              <a:t>Accessibility: standard notation and (relatively basic) method explanations should be present</a:t>
+            </a:r>
+          </a:p>
+          <a:p>
+            <a:pPr lvl="1"/>
+            <a:r>
+              <a:rPr lang="en-US" dirty="0"/>
+              <a:t>Readability: the paper should be easy to read with minimum effort</a:t>
             </a:r>
           </a:p>
         </p:txBody>
@@ -4248,7 +4249,7 @@
     </p:spTree>
     <p:extLst>
       <p:ext uri="{BB962C8B-B14F-4D97-AF65-F5344CB8AC3E}">
-        <p14:creationId xmlns:p14="http://schemas.microsoft.com/office/powerpoint/2010/main" val="3600066829"/>
+        <p14:creationId xmlns:p14="http://schemas.microsoft.com/office/powerpoint/2010/main" val="2932871023"/>
       </p:ext>
     </p:extLst>
   </p:cSld>
@@ -4280,7 +4281,7 @@
           <p:cNvPr id="2" name="Title 1">
             <a:extLst>
               <a:ext uri="{FF2B5EF4-FFF2-40B4-BE49-F238E27FC236}">
-                <a16:creationId xmlns:a16="http://schemas.microsoft.com/office/drawing/2014/main" xmlns="" id="{6531897C-3BCD-3545-A1A0-8DF283A636CE}"/>
+                <a16:creationId xmlns="" xmlns:a16="http://schemas.microsoft.com/office/drawing/2014/main" id="{932DCD78-F968-4D4D-A069-3CA872C2FD05}"/>
               </a:ext>
             </a:extLst>
           </p:cNvPr>
@@ -4298,7 +4299,7 @@
           <a:p>
             <a:r>
               <a:rPr lang="en-US" dirty="0"/>
-              <a:t>Sources (for above and more)</a:t>
+              <a:t>Reviewing a paper</a:t>
             </a:r>
           </a:p>
         </p:txBody>
@@ -4308,7 +4309,7 @@
           <p:cNvPr id="3" name="Content Placeholder 2">
             <a:extLst>
               <a:ext uri="{FF2B5EF4-FFF2-40B4-BE49-F238E27FC236}">
-                <a16:creationId xmlns:a16="http://schemas.microsoft.com/office/drawing/2014/main" xmlns="" id="{C037E65C-7748-C84A-B2D5-9B94BDA8D8C3}"/>
+                <a16:creationId xmlns="" xmlns:a16="http://schemas.microsoft.com/office/drawing/2014/main" id="{F3ECCF9F-E3A2-BD48-92ED-9DB8D5A3E5E8}"/>
               </a:ext>
             </a:extLst>
           </p:cNvPr>
@@ -4321,89 +4322,34 @@
         </p:nvSpPr>
         <p:spPr/>
         <p:txBody>
-          <a:bodyPr>
-            <a:normAutofit fontScale="85000" lnSpcReduction="10000"/>
-          </a:bodyPr>
-          <a:lstStyle/>
-          <a:p>
-            <a:r>
-              <a:rPr lang="en-US" dirty="0"/>
-              <a:t>Types of Peer Review</a:t>
-            </a:r>
-          </a:p>
-          <a:p>
-            <a:pPr lvl="1"/>
-            <a:r>
-              <a:rPr lang="en-US" dirty="0">
-                <a:hlinkClick r:id="rId2"/>
-              </a:rPr>
-              <a:t>https://authorservices.wiley.com/Reviewers/journal-reviewers/what-is-peer-review/types-of-peer-review.html</a:t>
-            </a:r>
-            <a:endParaRPr lang="en-US" dirty="0"/>
-          </a:p>
-          <a:p>
-            <a:r>
-              <a:rPr lang="en-GB" dirty="0"/>
-              <a:t>What is open peer review? A systematic review</a:t>
-            </a:r>
-          </a:p>
-          <a:p>
-            <a:pPr lvl="1"/>
-            <a:r>
-              <a:rPr lang="en-GB" b="1" dirty="0">
-                <a:hlinkClick r:id="rId3"/>
-              </a:rPr>
-              <a:t>https://www.ncbi.nlm.nih.gov/pmc/articles/PMC5437951/</a:t>
-            </a:r>
-            <a:r>
-              <a:rPr lang="en-GB" b="1" dirty="0"/>
-              <a:t>  </a:t>
-            </a:r>
-          </a:p>
-          <a:p>
-            <a:r>
-              <a:rPr lang="en-GB" dirty="0"/>
-              <a:t>Open Peer Review Characteristics Comparison.</a:t>
-            </a:r>
-          </a:p>
-          <a:p>
-            <a:pPr lvl="1"/>
-            <a:r>
-              <a:rPr lang="en-US" dirty="0">
-                <a:hlinkClick r:id="rId4"/>
-              </a:rPr>
-              <a:t>https://www.ncbi.nlm.nih.gov/pmc/articles/PMC4350441/table/T1/</a:t>
-            </a:r>
-            <a:endParaRPr lang="en-US" dirty="0"/>
-          </a:p>
-          <a:p>
-            <a:r>
-              <a:rPr lang="en-US" dirty="0"/>
-              <a:t>ICLR Peer Review System</a:t>
-            </a:r>
-          </a:p>
-          <a:p>
-            <a:pPr lvl="1"/>
-            <a:r>
-              <a:rPr lang="en-US" dirty="0">
-                <a:hlinkClick r:id="rId5"/>
-              </a:rPr>
-              <a:t>https://iclr.cc/Conferences/2018/CallForPapers</a:t>
-            </a:r>
-            <a:r>
-              <a:rPr lang="en-US" dirty="0"/>
-              <a:t>	 </a:t>
-            </a:r>
-          </a:p>
-          <a:p>
-            <a:endParaRPr lang="en-US" dirty="0"/>
+          <a:bodyPr/>
+          <a:lstStyle/>
+          <a:p>
+            <a:r>
+              <a:rPr lang="en-US" dirty="0"/>
+              <a:t>Sometimes reviewing goes wrong…</a:t>
+            </a:r>
+          </a:p>
+          <a:p>
+            <a:pPr lvl="1"/>
+            <a:r>
+              <a:rPr lang="en-US" dirty="0"/>
+              <a:t>Reviewer clearly didn’t understand the paper</a:t>
+            </a:r>
+          </a:p>
+          <a:p>
+            <a:pPr lvl="1"/>
+            <a:r>
+              <a:rPr lang="en-US" dirty="0"/>
+              <a:t>Reviews are too short</a:t>
+            </a:r>
           </a:p>
         </p:txBody>
       </p:sp>
     </p:spTree>
     <p:extLst>
       <p:ext uri="{BB962C8B-B14F-4D97-AF65-F5344CB8AC3E}">
-        <p14:creationId xmlns:p14="http://schemas.microsoft.com/office/powerpoint/2010/main" val="1505193481"/>
+        <p14:creationId xmlns:p14="http://schemas.microsoft.com/office/powerpoint/2010/main" val="3600066829"/>
       </p:ext>
     </p:extLst>
   </p:cSld>
@@ -4435,7 +4381,7 @@
           <p:cNvPr id="2" name="Title 1">
             <a:extLst>
               <a:ext uri="{FF2B5EF4-FFF2-40B4-BE49-F238E27FC236}">
-                <a16:creationId xmlns:a16="http://schemas.microsoft.com/office/drawing/2014/main" xmlns="" id="{6531897C-3BCD-3545-A1A0-8DF283A636CE}"/>
+                <a16:creationId xmlns="" xmlns:a16="http://schemas.microsoft.com/office/drawing/2014/main" id="{6531897C-3BCD-3545-A1A0-8DF283A636CE}"/>
               </a:ext>
             </a:extLst>
           </p:cNvPr>
@@ -4463,7 +4409,162 @@
           <p:cNvPr id="3" name="Content Placeholder 2">
             <a:extLst>
               <a:ext uri="{FF2B5EF4-FFF2-40B4-BE49-F238E27FC236}">
-                <a16:creationId xmlns:a16="http://schemas.microsoft.com/office/drawing/2014/main" xmlns="" id="{C037E65C-7748-C84A-B2D5-9B94BDA8D8C3}"/>
+                <a16:creationId xmlns="" xmlns:a16="http://schemas.microsoft.com/office/drawing/2014/main" id="{C037E65C-7748-C84A-B2D5-9B94BDA8D8C3}"/>
+              </a:ext>
+            </a:extLst>
+          </p:cNvPr>
+          <p:cNvSpPr>
+            <a:spLocks noGrp="1"/>
+          </p:cNvSpPr>
+          <p:nvPr>
+            <p:ph idx="1"/>
+          </p:nvPr>
+        </p:nvSpPr>
+        <p:spPr/>
+        <p:txBody>
+          <a:bodyPr>
+            <a:normAutofit fontScale="85000" lnSpcReduction="10000"/>
+          </a:bodyPr>
+          <a:lstStyle/>
+          <a:p>
+            <a:r>
+              <a:rPr lang="en-US" dirty="0"/>
+              <a:t>Types of Peer Review</a:t>
+            </a:r>
+          </a:p>
+          <a:p>
+            <a:pPr lvl="1"/>
+            <a:r>
+              <a:rPr lang="en-US" dirty="0">
+                <a:hlinkClick r:id="rId2"/>
+              </a:rPr>
+              <a:t>https://authorservices.wiley.com/Reviewers/journal-reviewers/what-is-peer-review/types-of-peer-review.html</a:t>
+            </a:r>
+            <a:endParaRPr lang="en-US" dirty="0"/>
+          </a:p>
+          <a:p>
+            <a:r>
+              <a:rPr lang="en-GB" dirty="0"/>
+              <a:t>What is open peer review? A systematic review</a:t>
+            </a:r>
+          </a:p>
+          <a:p>
+            <a:pPr lvl="1"/>
+            <a:r>
+              <a:rPr lang="en-GB" b="1" dirty="0">
+                <a:hlinkClick r:id="rId3"/>
+              </a:rPr>
+              <a:t>https://www.ncbi.nlm.nih.gov/pmc/articles/PMC5437951/</a:t>
+            </a:r>
+            <a:r>
+              <a:rPr lang="en-GB" b="1" dirty="0"/>
+              <a:t>  </a:t>
+            </a:r>
+          </a:p>
+          <a:p>
+            <a:r>
+              <a:rPr lang="en-GB" dirty="0"/>
+              <a:t>Open Peer Review Characteristics Comparison.</a:t>
+            </a:r>
+          </a:p>
+          <a:p>
+            <a:pPr lvl="1"/>
+            <a:r>
+              <a:rPr lang="en-US" dirty="0">
+                <a:hlinkClick r:id="rId4"/>
+              </a:rPr>
+              <a:t>https://www.ncbi.nlm.nih.gov/pmc/articles/PMC4350441/table/T1/</a:t>
+            </a:r>
+            <a:endParaRPr lang="en-US" dirty="0"/>
+          </a:p>
+          <a:p>
+            <a:r>
+              <a:rPr lang="en-US" dirty="0"/>
+              <a:t>ICLR Peer Review System</a:t>
+            </a:r>
+          </a:p>
+          <a:p>
+            <a:pPr lvl="1"/>
+            <a:r>
+              <a:rPr lang="en-US" dirty="0">
+                <a:hlinkClick r:id="rId5"/>
+              </a:rPr>
+              <a:t>https://iclr.cc/Conferences/2018/CallForPapers</a:t>
+            </a:r>
+            <a:r>
+              <a:rPr lang="en-US" dirty="0"/>
+              <a:t>	 </a:t>
+            </a:r>
+          </a:p>
+          <a:p>
+            <a:endParaRPr lang="en-US" dirty="0"/>
+          </a:p>
+        </p:txBody>
+      </p:sp>
+    </p:spTree>
+    <p:extLst>
+      <p:ext uri="{BB962C8B-B14F-4D97-AF65-F5344CB8AC3E}">
+        <p14:creationId xmlns:p14="http://schemas.microsoft.com/office/powerpoint/2010/main" val="1505193481"/>
+      </p:ext>
+    </p:extLst>
+  </p:cSld>
+  <p:clrMapOvr>
+    <a:masterClrMapping/>
+  </p:clrMapOvr>
+</p:sld>
+</file>
+
+<file path=ppt/slides/slide18.xml><?xml version="1.0" encoding="utf-8"?>
+<p:sld xmlns:a="http://schemas.openxmlformats.org/drawingml/2006/main" xmlns:r="http://schemas.openxmlformats.org/officeDocument/2006/relationships" xmlns:p="http://schemas.openxmlformats.org/presentationml/2006/main">
+  <p:cSld>
+    <p:spTree>
+      <p:nvGrpSpPr>
+        <p:cNvPr id="1" name=""/>
+        <p:cNvGrpSpPr/>
+        <p:nvPr/>
+      </p:nvGrpSpPr>
+      <p:grpSpPr>
+        <a:xfrm>
+          <a:off x="0" y="0"/>
+          <a:ext cx="0" cy="0"/>
+          <a:chOff x="0" y="0"/>
+          <a:chExt cx="0" cy="0"/>
+        </a:xfrm>
+      </p:grpSpPr>
+      <p:sp>
+        <p:nvSpPr>
+          <p:cNvPr id="2" name="Title 1">
+            <a:extLst>
+              <a:ext uri="{FF2B5EF4-FFF2-40B4-BE49-F238E27FC236}">
+                <a16:creationId xmlns="" xmlns:a16="http://schemas.microsoft.com/office/drawing/2014/main" id="{6531897C-3BCD-3545-A1A0-8DF283A636CE}"/>
+              </a:ext>
+            </a:extLst>
+          </p:cNvPr>
+          <p:cNvSpPr>
+            <a:spLocks noGrp="1"/>
+          </p:cNvSpPr>
+          <p:nvPr>
+            <p:ph type="title"/>
+          </p:nvPr>
+        </p:nvSpPr>
+        <p:spPr/>
+        <p:txBody>
+          <a:bodyPr/>
+          <a:lstStyle/>
+          <a:p>
+            <a:r>
+              <a:rPr lang="en-US" dirty="0"/>
+              <a:t>Sources (for above and more)</a:t>
+            </a:r>
+          </a:p>
+        </p:txBody>
+      </p:sp>
+      <p:sp>
+        <p:nvSpPr>
+          <p:cNvPr id="3" name="Content Placeholder 2">
+            <a:extLst>
+              <a:ext uri="{FF2B5EF4-FFF2-40B4-BE49-F238E27FC236}">
+                <a16:creationId xmlns="" xmlns:a16="http://schemas.microsoft.com/office/drawing/2014/main" id="{C037E65C-7748-C84A-B2D5-9B94BDA8D8C3}"/>
               </a:ext>
             </a:extLst>
           </p:cNvPr>
@@ -4711,7 +4812,7 @@
           <p:cNvPr id="2" name="Title 1">
             <a:extLst>
               <a:ext uri="{FF2B5EF4-FFF2-40B4-BE49-F238E27FC236}">
-                <a16:creationId xmlns:a16="http://schemas.microsoft.com/office/drawing/2014/main" xmlns="" id="{F3DD37B5-A98F-C34A-A5A5-DA2DD16D6BBA}"/>
+                <a16:creationId xmlns="" xmlns:a16="http://schemas.microsoft.com/office/drawing/2014/main" id="{F3DD37B5-A98F-C34A-A5A5-DA2DD16D6BBA}"/>
               </a:ext>
             </a:extLst>
           </p:cNvPr>
@@ -4739,7 +4840,7 @@
           <p:cNvPr id="3" name="Content Placeholder 2">
             <a:extLst>
               <a:ext uri="{FF2B5EF4-FFF2-40B4-BE49-F238E27FC236}">
-                <a16:creationId xmlns:a16="http://schemas.microsoft.com/office/drawing/2014/main" xmlns="" id="{349B6ECE-F1D9-6847-B9C8-3D8FD0679278}"/>
+                <a16:creationId xmlns="" xmlns:a16="http://schemas.microsoft.com/office/drawing/2014/main" id="{349B6ECE-F1D9-6847-B9C8-3D8FD0679278}"/>
               </a:ext>
             </a:extLst>
           </p:cNvPr>
@@ -4859,7 +4960,7 @@
           <p:cNvPr id="2" name="Title 1">
             <a:extLst>
               <a:ext uri="{FF2B5EF4-FFF2-40B4-BE49-F238E27FC236}">
-                <a16:creationId xmlns:a16="http://schemas.microsoft.com/office/drawing/2014/main" xmlns="" id="{7A9724EC-9390-9145-B540-49845CDCDD92}"/>
+                <a16:creationId xmlns="" xmlns:a16="http://schemas.microsoft.com/office/drawing/2014/main" id="{7A9724EC-9390-9145-B540-49845CDCDD92}"/>
               </a:ext>
             </a:extLst>
           </p:cNvPr>
@@ -4887,7 +4988,7 @@
           <p:cNvPr id="3" name="Content Placeholder 2">
             <a:extLst>
               <a:ext uri="{FF2B5EF4-FFF2-40B4-BE49-F238E27FC236}">
-                <a16:creationId xmlns:a16="http://schemas.microsoft.com/office/drawing/2014/main" xmlns="" id="{6A72A235-C304-3647-A30E-FF07507C5DB5}"/>
+                <a16:creationId xmlns="" xmlns:a16="http://schemas.microsoft.com/office/drawing/2014/main" id="{6A72A235-C304-3647-A30E-FF07507C5DB5}"/>
               </a:ext>
             </a:extLst>
           </p:cNvPr>
@@ -5010,7 +5111,7 @@
           <p:cNvPr id="2" name="Title 1">
             <a:extLst>
               <a:ext uri="{FF2B5EF4-FFF2-40B4-BE49-F238E27FC236}">
-                <a16:creationId xmlns:a16="http://schemas.microsoft.com/office/drawing/2014/main" xmlns="" id="{7A9724EC-9390-9145-B540-49845CDCDD92}"/>
+                <a16:creationId xmlns="" xmlns:a16="http://schemas.microsoft.com/office/drawing/2014/main" id="{7A9724EC-9390-9145-B540-49845CDCDD92}"/>
               </a:ext>
             </a:extLst>
           </p:cNvPr>
@@ -5038,7 +5139,7 @@
           <p:cNvPr id="3" name="Content Placeholder 2">
             <a:extLst>
               <a:ext uri="{FF2B5EF4-FFF2-40B4-BE49-F238E27FC236}">
-                <a16:creationId xmlns:a16="http://schemas.microsoft.com/office/drawing/2014/main" xmlns="" id="{6A72A235-C304-3647-A30E-FF07507C5DB5}"/>
+                <a16:creationId xmlns="" xmlns:a16="http://schemas.microsoft.com/office/drawing/2014/main" id="{6A72A235-C304-3647-A30E-FF07507C5DB5}"/>
               </a:ext>
             </a:extLst>
           </p:cNvPr>
@@ -5161,7 +5262,7 @@
           <p:cNvPr id="2" name="Title 1">
             <a:extLst>
               <a:ext uri="{FF2B5EF4-FFF2-40B4-BE49-F238E27FC236}">
-                <a16:creationId xmlns:a16="http://schemas.microsoft.com/office/drawing/2014/main" xmlns="" id="{7A9724EC-9390-9145-B540-49845CDCDD92}"/>
+                <a16:creationId xmlns="" xmlns:a16="http://schemas.microsoft.com/office/drawing/2014/main" id="{7A9724EC-9390-9145-B540-49845CDCDD92}"/>
               </a:ext>
             </a:extLst>
           </p:cNvPr>
@@ -5189,7 +5290,7 @@
           <p:cNvPr id="3" name="Content Placeholder 2">
             <a:extLst>
               <a:ext uri="{FF2B5EF4-FFF2-40B4-BE49-F238E27FC236}">
-                <a16:creationId xmlns:a16="http://schemas.microsoft.com/office/drawing/2014/main" xmlns="" id="{6A72A235-C304-3647-A30E-FF07507C5DB5}"/>
+                <a16:creationId xmlns="" xmlns:a16="http://schemas.microsoft.com/office/drawing/2014/main" id="{6A72A235-C304-3647-A30E-FF07507C5DB5}"/>
               </a:ext>
             </a:extLst>
           </p:cNvPr>
@@ -5350,7 +5451,7 @@
           <p:cNvPr id="2" name="Title 1">
             <a:extLst>
               <a:ext uri="{FF2B5EF4-FFF2-40B4-BE49-F238E27FC236}">
-                <a16:creationId xmlns:a16="http://schemas.microsoft.com/office/drawing/2014/main" xmlns="" id="{7A9724EC-9390-9145-B540-49845CDCDD92}"/>
+                <a16:creationId xmlns="" xmlns:a16="http://schemas.microsoft.com/office/drawing/2014/main" id="{7A9724EC-9390-9145-B540-49845CDCDD92}"/>
               </a:ext>
             </a:extLst>
           </p:cNvPr>
@@ -5378,7 +5479,7 @@
           <p:cNvPr id="3" name="Content Placeholder 2">
             <a:extLst>
               <a:ext uri="{FF2B5EF4-FFF2-40B4-BE49-F238E27FC236}">
-                <a16:creationId xmlns:a16="http://schemas.microsoft.com/office/drawing/2014/main" xmlns="" id="{6A72A235-C304-3647-A30E-FF07507C5DB5}"/>
+                <a16:creationId xmlns="" xmlns:a16="http://schemas.microsoft.com/office/drawing/2014/main" id="{6A72A235-C304-3647-A30E-FF07507C5DB5}"/>
               </a:ext>
             </a:extLst>
           </p:cNvPr>
@@ -5480,94 +5581,40 @@
           <a:chExt cx="0" cy="0"/>
         </a:xfrm>
       </p:grpSpPr>
-      <p:sp>
-        <p:nvSpPr>
-          <p:cNvPr id="2" name="Title 1">
+      <p:pic>
+        <p:nvPicPr>
+          <p:cNvPr id="4" name="Picture 3"/>
+          <p:cNvPicPr>
+            <a:picLocks noChangeAspect="1"/>
+          </p:cNvPicPr>
+          <p:nvPr/>
+        </p:nvPicPr>
+        <p:blipFill>
+          <a:blip r:embed="rId2">
             <a:extLst>
-              <a:ext uri="{FF2B5EF4-FFF2-40B4-BE49-F238E27FC236}">
-                <a16:creationId xmlns:a16="http://schemas.microsoft.com/office/drawing/2014/main" xmlns="" id="{4247AADA-0595-7E47-AA9C-2D10E53F61E8}"/>
+              <a:ext uri="{28A0092B-C50C-407E-A947-70E740481C1C}">
+                <a14:useLocalDpi xmlns:a14="http://schemas.microsoft.com/office/drawing/2010/main" val="0"/>
               </a:ext>
             </a:extLst>
-          </p:cNvPr>
-          <p:cNvSpPr>
-            <a:spLocks noGrp="1"/>
-          </p:cNvSpPr>
-          <p:nvPr>
-            <p:ph type="title"/>
-          </p:nvPr>
-        </p:nvSpPr>
-        <p:spPr/>
-        <p:txBody>
-          <a:bodyPr/>
-          <a:lstStyle/>
-          <a:p>
-            <a:r>
-              <a:rPr lang="en-US" dirty="0"/>
-              <a:t>The Peer Review process</a:t>
-            </a:r>
-          </a:p>
-        </p:txBody>
-      </p:sp>
-      <p:sp>
-        <p:nvSpPr>
-          <p:cNvPr id="3" name="Content Placeholder 2">
-            <a:extLst>
-              <a:ext uri="{FF2B5EF4-FFF2-40B4-BE49-F238E27FC236}">
-                <a16:creationId xmlns:a16="http://schemas.microsoft.com/office/drawing/2014/main" xmlns="" id="{80C93237-A2CC-7946-B3D0-82AD8B94F165}"/>
-              </a:ext>
-            </a:extLst>
-          </p:cNvPr>
-          <p:cNvSpPr>
-            <a:spLocks noGrp="1"/>
-          </p:cNvSpPr>
-          <p:nvPr>
-            <p:ph idx="1"/>
-          </p:nvPr>
-        </p:nvSpPr>
-        <p:spPr/>
-        <p:txBody>
-          <a:bodyPr/>
-          <a:lstStyle/>
-          <a:p>
-            <a:r>
-              <a:rPr lang="en-US" dirty="0"/>
-              <a:t>The peer-review process is meant to guarantee:</a:t>
-            </a:r>
-          </a:p>
-          <a:p>
-            <a:pPr lvl="1"/>
-            <a:r>
-              <a:rPr lang="en-US" dirty="0"/>
-              <a:t>Only articles that meet good scientific standards are accepted for publication.</a:t>
-            </a:r>
-          </a:p>
-          <a:p>
-            <a:pPr lvl="1"/>
-            <a:r>
-              <a:rPr lang="en-US" dirty="0"/>
-              <a:t>The methods are appropriate.</a:t>
-            </a:r>
-          </a:p>
-          <a:p>
-            <a:pPr lvl="1"/>
-            <a:r>
-              <a:rPr lang="en-US" dirty="0"/>
-              <a:t>Results are accurate and properly interpreted.</a:t>
-            </a:r>
-          </a:p>
-          <a:p>
-            <a:pPr lvl="1"/>
-            <a:r>
-              <a:rPr lang="en-US" dirty="0"/>
-              <a:t>There is a solid and relevant body of related work described.</a:t>
-            </a:r>
-          </a:p>
-        </p:txBody>
-      </p:sp>
+          </a:blip>
+          <a:stretch>
+            <a:fillRect/>
+          </a:stretch>
+        </p:blipFill>
+        <p:spPr>
+          <a:xfrm>
+            <a:off x="3365500" y="0"/>
+            <a:ext cx="2393366" cy="6858000"/>
+          </a:xfrm>
+          <a:prstGeom prst="rect">
+            <a:avLst/>
+          </a:prstGeom>
+        </p:spPr>
+      </p:pic>
     </p:spTree>
     <p:extLst>
       <p:ext uri="{BB962C8B-B14F-4D97-AF65-F5344CB8AC3E}">
-        <p14:creationId xmlns:p14="http://schemas.microsoft.com/office/powerpoint/2010/main" val="1528963900"/>
+        <p14:creationId xmlns:p14="http://schemas.microsoft.com/office/powerpoint/2010/main" val="1538057824"/>
       </p:ext>
     </p:extLst>
   </p:cSld>
@@ -5599,7 +5646,7 @@
           <p:cNvPr id="2" name="Title 1">
             <a:extLst>
               <a:ext uri="{FF2B5EF4-FFF2-40B4-BE49-F238E27FC236}">
-                <a16:creationId xmlns:a16="http://schemas.microsoft.com/office/drawing/2014/main" xmlns="" id="{B2315989-EC25-BC46-8665-6F3AB82AAABA}"/>
+                <a16:creationId xmlns="" xmlns:a16="http://schemas.microsoft.com/office/drawing/2014/main" id="{4247AADA-0595-7E47-AA9C-2D10E53F61E8}"/>
               </a:ext>
             </a:extLst>
           </p:cNvPr>
@@ -5617,57 +5664,71 @@
           <a:p>
             <a:r>
               <a:rPr lang="en-US" dirty="0"/>
-              <a:t>Reviewing a paper</a:t>
-            </a:r>
-          </a:p>
-        </p:txBody>
-      </p:sp>
-      <p:pic>
-        <p:nvPicPr>
-          <p:cNvPr id="5" name="Picture 4">
+              <a:t>The Peer Review process</a:t>
+            </a:r>
+          </a:p>
+        </p:txBody>
+      </p:sp>
+      <p:sp>
+        <p:nvSpPr>
+          <p:cNvPr id="3" name="Content Placeholder 2">
             <a:extLst>
               <a:ext uri="{FF2B5EF4-FFF2-40B4-BE49-F238E27FC236}">
-                <a16:creationId xmlns:a16="http://schemas.microsoft.com/office/drawing/2014/main" xmlns="" id="{95A12A66-02CE-5A40-A32D-4F69AB1BAA98}"/>
+                <a16:creationId xmlns="" xmlns:a16="http://schemas.microsoft.com/office/drawing/2014/main" id="{80C93237-A2CC-7946-B3D0-82AD8B94F165}"/>
               </a:ext>
             </a:extLst>
           </p:cNvPr>
-          <p:cNvPicPr>
-            <a:picLocks noChangeAspect="1"/>
-          </p:cNvPicPr>
-          <p:nvPr/>
-        </p:nvPicPr>
-        <p:blipFill>
-          <a:blip r:embed="rId2">
-            <a:extLst>
-              <a:ext uri="{28A0092B-C50C-407E-A947-70E740481C1C}">
-                <a14:useLocalDpi xmlns:a14="http://schemas.microsoft.com/office/drawing/2010/main" val="0"/>
-              </a:ext>
-            </a:extLst>
-          </a:blip>
-          <a:stretch>
-            <a:fillRect/>
-          </a:stretch>
-        </p:blipFill>
-        <p:spPr>
-          <a:xfrm>
-            <a:off x="-414300" y="1271497"/>
-            <a:ext cx="9972600" cy="5586503"/>
-          </a:xfrm>
-          <a:prstGeom prst="rect">
-            <a:avLst/>
-          </a:prstGeom>
-          <a:solidFill>
-            <a:schemeClr val="bg1">
-              <a:lumMod val="85000"/>
-              <a:lumOff val="15000"/>
-            </a:schemeClr>
-          </a:solidFill>
-        </p:spPr>
-      </p:pic>
+          <p:cNvSpPr>
+            <a:spLocks noGrp="1"/>
+          </p:cNvSpPr>
+          <p:nvPr>
+            <p:ph idx="1"/>
+          </p:nvPr>
+        </p:nvSpPr>
+        <p:spPr/>
+        <p:txBody>
+          <a:bodyPr/>
+          <a:lstStyle/>
+          <a:p>
+            <a:r>
+              <a:rPr lang="en-US" dirty="0"/>
+              <a:t>The peer-review process is meant to guarantee:</a:t>
+            </a:r>
+          </a:p>
+          <a:p>
+            <a:pPr lvl="1"/>
+            <a:r>
+              <a:rPr lang="en-US" dirty="0"/>
+              <a:t>Only articles that meet good scientific standards are accepted for publication.</a:t>
+            </a:r>
+          </a:p>
+          <a:p>
+            <a:pPr lvl="1"/>
+            <a:r>
+              <a:rPr lang="en-US" dirty="0"/>
+              <a:t>The methods are appropriate.</a:t>
+            </a:r>
+          </a:p>
+          <a:p>
+            <a:pPr lvl="1"/>
+            <a:r>
+              <a:rPr lang="en-US" dirty="0"/>
+              <a:t>Results are accurate and properly interpreted.</a:t>
+            </a:r>
+          </a:p>
+          <a:p>
+            <a:pPr lvl="1"/>
+            <a:r>
+              <a:rPr lang="en-US" dirty="0"/>
+              <a:t>There is a solid and relevant body of related work described.</a:t>
+            </a:r>
+          </a:p>
+        </p:txBody>
+      </p:sp>
     </p:spTree>
     <p:extLst>
       <p:ext uri="{BB962C8B-B14F-4D97-AF65-F5344CB8AC3E}">
-        <p14:creationId xmlns:p14="http://schemas.microsoft.com/office/powerpoint/2010/main" val="1878124213"/>
+        <p14:creationId xmlns:p14="http://schemas.microsoft.com/office/powerpoint/2010/main" val="1528963900"/>
       </p:ext>
     </p:extLst>
   </p:cSld>

</xml_diff>

<commit_message>
adding more info to 'things going wrong'
</commit_message>
<xml_diff>
--- a/lectures/Peer Review.pptx
+++ b/lectures/Peer Review.pptx
@@ -225,7 +225,7 @@
           <a:p>
             <a:fld id="{8E1C398D-1701-43C2-B648-89BD4BCADD0C}" type="datetimeFigureOut">
               <a:rPr lang="nl-NL" smtClean="0"/>
-              <a:t>13-06-18</a:t>
+              <a:t>14-06-18</a:t>
             </a:fld>
             <a:endParaRPr lang="nl-NL"/>
           </a:p>
@@ -671,7 +671,7 @@
           <a:p>
             <a:fld id="{F54FBDE4-1B9A-4EE0-9E69-28A91B8366FA}" type="datetimeFigureOut">
               <a:rPr lang="nl-NL" smtClean="0"/>
-              <a:t>13-06-18</a:t>
+              <a:t>14-06-18</a:t>
             </a:fld>
             <a:endParaRPr lang="nl-NL"/>
           </a:p>
@@ -839,7 +839,7 @@
           <a:p>
             <a:fld id="{F54FBDE4-1B9A-4EE0-9E69-28A91B8366FA}" type="datetimeFigureOut">
               <a:rPr lang="nl-NL" smtClean="0"/>
-              <a:t>13-06-18</a:t>
+              <a:t>14-06-18</a:t>
             </a:fld>
             <a:endParaRPr lang="nl-NL"/>
           </a:p>
@@ -1017,7 +1017,7 @@
           <a:p>
             <a:fld id="{F54FBDE4-1B9A-4EE0-9E69-28A91B8366FA}" type="datetimeFigureOut">
               <a:rPr lang="nl-NL" smtClean="0"/>
-              <a:t>13-06-18</a:t>
+              <a:t>14-06-18</a:t>
             </a:fld>
             <a:endParaRPr lang="nl-NL"/>
           </a:p>
@@ -1185,7 +1185,7 @@
           <a:p>
             <a:fld id="{F54FBDE4-1B9A-4EE0-9E69-28A91B8366FA}" type="datetimeFigureOut">
               <a:rPr lang="nl-NL" smtClean="0"/>
-              <a:t>13-06-18</a:t>
+              <a:t>14-06-18</a:t>
             </a:fld>
             <a:endParaRPr lang="nl-NL"/>
           </a:p>
@@ -1430,7 +1430,7 @@
           <a:p>
             <a:fld id="{F54FBDE4-1B9A-4EE0-9E69-28A91B8366FA}" type="datetimeFigureOut">
               <a:rPr lang="nl-NL" smtClean="0"/>
-              <a:t>13-06-18</a:t>
+              <a:t>14-06-18</a:t>
             </a:fld>
             <a:endParaRPr lang="nl-NL"/>
           </a:p>
@@ -1715,7 +1715,7 @@
           <a:p>
             <a:fld id="{F54FBDE4-1B9A-4EE0-9E69-28A91B8366FA}" type="datetimeFigureOut">
               <a:rPr lang="nl-NL" smtClean="0"/>
-              <a:t>13-06-18</a:t>
+              <a:t>14-06-18</a:t>
             </a:fld>
             <a:endParaRPr lang="nl-NL"/>
           </a:p>
@@ -2134,7 +2134,7 @@
           <a:p>
             <a:fld id="{F54FBDE4-1B9A-4EE0-9E69-28A91B8366FA}" type="datetimeFigureOut">
               <a:rPr lang="nl-NL" smtClean="0"/>
-              <a:t>13-06-18</a:t>
+              <a:t>14-06-18</a:t>
             </a:fld>
             <a:endParaRPr lang="nl-NL"/>
           </a:p>
@@ -2251,7 +2251,7 @@
           <a:p>
             <a:fld id="{F54FBDE4-1B9A-4EE0-9E69-28A91B8366FA}" type="datetimeFigureOut">
               <a:rPr lang="nl-NL" smtClean="0"/>
-              <a:t>13-06-18</a:t>
+              <a:t>14-06-18</a:t>
             </a:fld>
             <a:endParaRPr lang="nl-NL"/>
           </a:p>
@@ -2346,7 +2346,7 @@
           <a:p>
             <a:fld id="{F54FBDE4-1B9A-4EE0-9E69-28A91B8366FA}" type="datetimeFigureOut">
               <a:rPr lang="nl-NL" smtClean="0"/>
-              <a:t>13-06-18</a:t>
+              <a:t>14-06-18</a:t>
             </a:fld>
             <a:endParaRPr lang="nl-NL"/>
           </a:p>
@@ -2621,7 +2621,7 @@
           <a:p>
             <a:fld id="{F54FBDE4-1B9A-4EE0-9E69-28A91B8366FA}" type="datetimeFigureOut">
               <a:rPr lang="nl-NL" smtClean="0"/>
-              <a:t>13-06-18</a:t>
+              <a:t>14-06-18</a:t>
             </a:fld>
             <a:endParaRPr lang="nl-NL"/>
           </a:p>
@@ -2873,7 +2873,7 @@
           <a:p>
             <a:fld id="{F54FBDE4-1B9A-4EE0-9E69-28A91B8366FA}" type="datetimeFigureOut">
               <a:rPr lang="nl-NL" smtClean="0"/>
-              <a:t>13-06-18</a:t>
+              <a:t>14-06-18</a:t>
             </a:fld>
             <a:endParaRPr lang="nl-NL"/>
           </a:p>
@@ -3084,7 +3084,7 @@
           <a:p>
             <a:fld id="{F54FBDE4-1B9A-4EE0-9E69-28A91B8366FA}" type="datetimeFigureOut">
               <a:rPr lang="nl-NL" smtClean="0"/>
-              <a:t>13-06-18</a:t>
+              <a:t>14-06-18</a:t>
             </a:fld>
             <a:endParaRPr lang="nl-NL"/>
           </a:p>
@@ -3554,7 +3554,7 @@
           <p:cNvPr id="2" name="Title 1">
             <a:extLst>
               <a:ext uri="{FF2B5EF4-FFF2-40B4-BE49-F238E27FC236}">
-                <a16:creationId xmlns="" xmlns:a16="http://schemas.microsoft.com/office/drawing/2014/main" id="{B2315989-EC25-BC46-8665-6F3AB82AAABA}"/>
+                <a16:creationId xmlns:a16="http://schemas.microsoft.com/office/drawing/2014/main" id="{B2315989-EC25-BC46-8665-6F3AB82AAABA}"/>
               </a:ext>
             </a:extLst>
           </p:cNvPr>
@@ -3582,7 +3582,7 @@
           <p:cNvPr id="5" name="Picture 4">
             <a:extLst>
               <a:ext uri="{FF2B5EF4-FFF2-40B4-BE49-F238E27FC236}">
-                <a16:creationId xmlns="" xmlns:a16="http://schemas.microsoft.com/office/drawing/2014/main" id="{95A12A66-02CE-5A40-A32D-4F69AB1BAA98}"/>
+                <a16:creationId xmlns:a16="http://schemas.microsoft.com/office/drawing/2014/main" id="{95A12A66-02CE-5A40-A32D-4F69AB1BAA98}"/>
               </a:ext>
             </a:extLst>
           </p:cNvPr>
@@ -3654,7 +3654,7 @@
           <p:cNvPr id="2" name="Title 1">
             <a:extLst>
               <a:ext uri="{FF2B5EF4-FFF2-40B4-BE49-F238E27FC236}">
-                <a16:creationId xmlns="" xmlns:a16="http://schemas.microsoft.com/office/drawing/2014/main" id="{B2315989-EC25-BC46-8665-6F3AB82AAABA}"/>
+                <a16:creationId xmlns:a16="http://schemas.microsoft.com/office/drawing/2014/main" id="{B2315989-EC25-BC46-8665-6F3AB82AAABA}"/>
               </a:ext>
             </a:extLst>
           </p:cNvPr>
@@ -3682,7 +3682,7 @@
           <p:cNvPr id="4" name="Picture 3">
             <a:extLst>
               <a:ext uri="{FF2B5EF4-FFF2-40B4-BE49-F238E27FC236}">
-                <a16:creationId xmlns="" xmlns:a16="http://schemas.microsoft.com/office/drawing/2014/main" id="{6321BE5C-0B0B-864B-9EB4-F243FA9148A7}"/>
+                <a16:creationId xmlns:a16="http://schemas.microsoft.com/office/drawing/2014/main" id="{6321BE5C-0B0B-864B-9EB4-F243FA9148A7}"/>
               </a:ext>
             </a:extLst>
           </p:cNvPr>
@@ -3754,7 +3754,7 @@
           <p:cNvPr id="2" name="Title 1">
             <a:extLst>
               <a:ext uri="{FF2B5EF4-FFF2-40B4-BE49-F238E27FC236}">
-                <a16:creationId xmlns="" xmlns:a16="http://schemas.microsoft.com/office/drawing/2014/main" id="{B2315989-EC25-BC46-8665-6F3AB82AAABA}"/>
+                <a16:creationId xmlns:a16="http://schemas.microsoft.com/office/drawing/2014/main" id="{B2315989-EC25-BC46-8665-6F3AB82AAABA}"/>
               </a:ext>
             </a:extLst>
           </p:cNvPr>
@@ -3782,7 +3782,7 @@
           <p:cNvPr id="5" name="Picture 4">
             <a:extLst>
               <a:ext uri="{FF2B5EF4-FFF2-40B4-BE49-F238E27FC236}">
-                <a16:creationId xmlns="" xmlns:a16="http://schemas.microsoft.com/office/drawing/2014/main" id="{1EA6B3C9-6663-6048-B19F-322A929A1B0E}"/>
+                <a16:creationId xmlns:a16="http://schemas.microsoft.com/office/drawing/2014/main" id="{1EA6B3C9-6663-6048-B19F-322A929A1B0E}"/>
               </a:ext>
             </a:extLst>
           </p:cNvPr>
@@ -3854,7 +3854,7 @@
           <p:cNvPr id="2" name="Title 1">
             <a:extLst>
               <a:ext uri="{FF2B5EF4-FFF2-40B4-BE49-F238E27FC236}">
-                <a16:creationId xmlns="" xmlns:a16="http://schemas.microsoft.com/office/drawing/2014/main" id="{AF6D0803-635C-2B41-BC0F-78432AFFE96B}"/>
+                <a16:creationId xmlns:a16="http://schemas.microsoft.com/office/drawing/2014/main" id="{AF6D0803-635C-2B41-BC0F-78432AFFE96B}"/>
               </a:ext>
             </a:extLst>
           </p:cNvPr>
@@ -3882,7 +3882,7 @@
           <p:cNvPr id="3" name="Content Placeholder 2">
             <a:extLst>
               <a:ext uri="{FF2B5EF4-FFF2-40B4-BE49-F238E27FC236}">
-                <a16:creationId xmlns="" xmlns:a16="http://schemas.microsoft.com/office/drawing/2014/main" id="{A6FFC659-F1F6-E743-8499-E0B134A6A49F}"/>
+                <a16:creationId xmlns:a16="http://schemas.microsoft.com/office/drawing/2014/main" id="{A6FFC659-F1F6-E743-8499-E0B134A6A49F}"/>
               </a:ext>
             </a:extLst>
           </p:cNvPr>
@@ -3979,7 +3979,7 @@
           <p:cNvPr id="2" name="Title 1">
             <a:extLst>
               <a:ext uri="{FF2B5EF4-FFF2-40B4-BE49-F238E27FC236}">
-                <a16:creationId xmlns="" xmlns:a16="http://schemas.microsoft.com/office/drawing/2014/main" id="{05D345EE-1171-634E-B7E3-BA3ACEA59116}"/>
+                <a16:creationId xmlns:a16="http://schemas.microsoft.com/office/drawing/2014/main" id="{05D345EE-1171-634E-B7E3-BA3ACEA59116}"/>
               </a:ext>
             </a:extLst>
           </p:cNvPr>
@@ -4007,7 +4007,7 @@
           <p:cNvPr id="3" name="Content Placeholder 2">
             <a:extLst>
               <a:ext uri="{FF2B5EF4-FFF2-40B4-BE49-F238E27FC236}">
-                <a16:creationId xmlns="" xmlns:a16="http://schemas.microsoft.com/office/drawing/2014/main" id="{57567907-341A-C241-86F2-90F002212C83}"/>
+                <a16:creationId xmlns:a16="http://schemas.microsoft.com/office/drawing/2014/main" id="{57567907-341A-C241-86F2-90F002212C83}"/>
               </a:ext>
             </a:extLst>
           </p:cNvPr>
@@ -4137,7 +4137,7 @@
           <p:cNvPr id="2" name="Title 1">
             <a:extLst>
               <a:ext uri="{FF2B5EF4-FFF2-40B4-BE49-F238E27FC236}">
-                <a16:creationId xmlns="" xmlns:a16="http://schemas.microsoft.com/office/drawing/2014/main" id="{15E00A2A-5BC8-8A4F-A076-12F12A5CF1DC}"/>
+                <a16:creationId xmlns:a16="http://schemas.microsoft.com/office/drawing/2014/main" id="{15E00A2A-5BC8-8A4F-A076-12F12A5CF1DC}"/>
               </a:ext>
             </a:extLst>
           </p:cNvPr>
@@ -4165,7 +4165,7 @@
           <p:cNvPr id="3" name="Content Placeholder 2">
             <a:extLst>
               <a:ext uri="{FF2B5EF4-FFF2-40B4-BE49-F238E27FC236}">
-                <a16:creationId xmlns="" xmlns:a16="http://schemas.microsoft.com/office/drawing/2014/main" id="{09D8575D-AB89-8A4F-BEC7-D66FE091AC3B}"/>
+                <a16:creationId xmlns:a16="http://schemas.microsoft.com/office/drawing/2014/main" id="{09D8575D-AB89-8A4F-BEC7-D66FE091AC3B}"/>
               </a:ext>
             </a:extLst>
           </p:cNvPr>
@@ -4281,7 +4281,7 @@
           <p:cNvPr id="2" name="Title 1">
             <a:extLst>
               <a:ext uri="{FF2B5EF4-FFF2-40B4-BE49-F238E27FC236}">
-                <a16:creationId xmlns="" xmlns:a16="http://schemas.microsoft.com/office/drawing/2014/main" id="{932DCD78-F968-4D4D-A069-3CA872C2FD05}"/>
+                <a16:creationId xmlns:a16="http://schemas.microsoft.com/office/drawing/2014/main" id="{932DCD78-F968-4D4D-A069-3CA872C2FD05}"/>
               </a:ext>
             </a:extLst>
           </p:cNvPr>
@@ -4309,7 +4309,7 @@
           <p:cNvPr id="3" name="Content Placeholder 2">
             <a:extLst>
               <a:ext uri="{FF2B5EF4-FFF2-40B4-BE49-F238E27FC236}">
-                <a16:creationId xmlns="" xmlns:a16="http://schemas.microsoft.com/office/drawing/2014/main" id="{F3ECCF9F-E3A2-BD48-92ED-9DB8D5A3E5E8}"/>
+                <a16:creationId xmlns:a16="http://schemas.microsoft.com/office/drawing/2014/main" id="{F3ECCF9F-E3A2-BD48-92ED-9DB8D5A3E5E8}"/>
               </a:ext>
             </a:extLst>
           </p:cNvPr>
@@ -4327,7 +4327,21 @@
           <a:p>
             <a:r>
               <a:rPr lang="en-US" dirty="0"/>
-              <a:t>Sometimes reviewing goes wrong…</a:t>
+              <a:t>This is the </a:t>
+            </a:r>
+            <a:r>
+              <a:rPr lang="en-US" i="1" dirty="0"/>
+              <a:t>ideal</a:t>
+            </a:r>
+            <a:r>
+              <a:rPr lang="en-US" dirty="0"/>
+              <a:t> peer-review process.</a:t>
+            </a:r>
+          </a:p>
+          <a:p>
+            <a:r>
+              <a:rPr lang="en-US" dirty="0"/>
+              <a:t>But sometimes reviewing goes wrong…</a:t>
             </a:r>
           </a:p>
           <a:p>
@@ -4342,6 +4356,20 @@
             <a:r>
               <a:rPr lang="en-US" dirty="0"/>
               <a:t>Reviews are too short</a:t>
+            </a:r>
+          </a:p>
+          <a:p>
+            <a:pPr lvl="1"/>
+            <a:r>
+              <a:rPr lang="en-US" dirty="0"/>
+              <a:t>Reviews can be contradictory</a:t>
+            </a:r>
+          </a:p>
+          <a:p>
+            <a:pPr lvl="1"/>
+            <a:r>
+              <a:rPr lang="en-US" dirty="0"/>
+              <a:t>Reviews are voluntary (most cases): time constraints prevent you from doing a completely thorough work. But you need to be as fair as possible!</a:t>
             </a:r>
           </a:p>
         </p:txBody>
@@ -4381,7 +4409,7 @@
           <p:cNvPr id="2" name="Title 1">
             <a:extLst>
               <a:ext uri="{FF2B5EF4-FFF2-40B4-BE49-F238E27FC236}">
-                <a16:creationId xmlns="" xmlns:a16="http://schemas.microsoft.com/office/drawing/2014/main" id="{6531897C-3BCD-3545-A1A0-8DF283A636CE}"/>
+                <a16:creationId xmlns:a16="http://schemas.microsoft.com/office/drawing/2014/main" id="{6531897C-3BCD-3545-A1A0-8DF283A636CE}"/>
               </a:ext>
             </a:extLst>
           </p:cNvPr>
@@ -4409,7 +4437,7 @@
           <p:cNvPr id="3" name="Content Placeholder 2">
             <a:extLst>
               <a:ext uri="{FF2B5EF4-FFF2-40B4-BE49-F238E27FC236}">
-                <a16:creationId xmlns="" xmlns:a16="http://schemas.microsoft.com/office/drawing/2014/main" id="{C037E65C-7748-C84A-B2D5-9B94BDA8D8C3}"/>
+                <a16:creationId xmlns:a16="http://schemas.microsoft.com/office/drawing/2014/main" id="{C037E65C-7748-C84A-B2D5-9B94BDA8D8C3}"/>
               </a:ext>
             </a:extLst>
           </p:cNvPr>
@@ -4536,7 +4564,7 @@
           <p:cNvPr id="2" name="Title 1">
             <a:extLst>
               <a:ext uri="{FF2B5EF4-FFF2-40B4-BE49-F238E27FC236}">
-                <a16:creationId xmlns="" xmlns:a16="http://schemas.microsoft.com/office/drawing/2014/main" id="{6531897C-3BCD-3545-A1A0-8DF283A636CE}"/>
+                <a16:creationId xmlns:a16="http://schemas.microsoft.com/office/drawing/2014/main" id="{6531897C-3BCD-3545-A1A0-8DF283A636CE}"/>
               </a:ext>
             </a:extLst>
           </p:cNvPr>
@@ -4564,7 +4592,7 @@
           <p:cNvPr id="3" name="Content Placeholder 2">
             <a:extLst>
               <a:ext uri="{FF2B5EF4-FFF2-40B4-BE49-F238E27FC236}">
-                <a16:creationId xmlns="" xmlns:a16="http://schemas.microsoft.com/office/drawing/2014/main" id="{C037E65C-7748-C84A-B2D5-9B94BDA8D8C3}"/>
+                <a16:creationId xmlns:a16="http://schemas.microsoft.com/office/drawing/2014/main" id="{C037E65C-7748-C84A-B2D5-9B94BDA8D8C3}"/>
               </a:ext>
             </a:extLst>
           </p:cNvPr>
@@ -4812,7 +4840,7 @@
           <p:cNvPr id="2" name="Title 1">
             <a:extLst>
               <a:ext uri="{FF2B5EF4-FFF2-40B4-BE49-F238E27FC236}">
-                <a16:creationId xmlns="" xmlns:a16="http://schemas.microsoft.com/office/drawing/2014/main" id="{F3DD37B5-A98F-C34A-A5A5-DA2DD16D6BBA}"/>
+                <a16:creationId xmlns:a16="http://schemas.microsoft.com/office/drawing/2014/main" id="{F3DD37B5-A98F-C34A-A5A5-DA2DD16D6BBA}"/>
               </a:ext>
             </a:extLst>
           </p:cNvPr>
@@ -4840,7 +4868,7 @@
           <p:cNvPr id="3" name="Content Placeholder 2">
             <a:extLst>
               <a:ext uri="{FF2B5EF4-FFF2-40B4-BE49-F238E27FC236}">
-                <a16:creationId xmlns="" xmlns:a16="http://schemas.microsoft.com/office/drawing/2014/main" id="{349B6ECE-F1D9-6847-B9C8-3D8FD0679278}"/>
+                <a16:creationId xmlns:a16="http://schemas.microsoft.com/office/drawing/2014/main" id="{349B6ECE-F1D9-6847-B9C8-3D8FD0679278}"/>
               </a:ext>
             </a:extLst>
           </p:cNvPr>
@@ -4960,7 +4988,7 @@
           <p:cNvPr id="2" name="Title 1">
             <a:extLst>
               <a:ext uri="{FF2B5EF4-FFF2-40B4-BE49-F238E27FC236}">
-                <a16:creationId xmlns="" xmlns:a16="http://schemas.microsoft.com/office/drawing/2014/main" id="{7A9724EC-9390-9145-B540-49845CDCDD92}"/>
+                <a16:creationId xmlns:a16="http://schemas.microsoft.com/office/drawing/2014/main" id="{7A9724EC-9390-9145-B540-49845CDCDD92}"/>
               </a:ext>
             </a:extLst>
           </p:cNvPr>
@@ -4988,7 +5016,7 @@
           <p:cNvPr id="3" name="Content Placeholder 2">
             <a:extLst>
               <a:ext uri="{FF2B5EF4-FFF2-40B4-BE49-F238E27FC236}">
-                <a16:creationId xmlns="" xmlns:a16="http://schemas.microsoft.com/office/drawing/2014/main" id="{6A72A235-C304-3647-A30E-FF07507C5DB5}"/>
+                <a16:creationId xmlns:a16="http://schemas.microsoft.com/office/drawing/2014/main" id="{6A72A235-C304-3647-A30E-FF07507C5DB5}"/>
               </a:ext>
             </a:extLst>
           </p:cNvPr>
@@ -5111,7 +5139,7 @@
           <p:cNvPr id="2" name="Title 1">
             <a:extLst>
               <a:ext uri="{FF2B5EF4-FFF2-40B4-BE49-F238E27FC236}">
-                <a16:creationId xmlns="" xmlns:a16="http://schemas.microsoft.com/office/drawing/2014/main" id="{7A9724EC-9390-9145-B540-49845CDCDD92}"/>
+                <a16:creationId xmlns:a16="http://schemas.microsoft.com/office/drawing/2014/main" id="{7A9724EC-9390-9145-B540-49845CDCDD92}"/>
               </a:ext>
             </a:extLst>
           </p:cNvPr>
@@ -5139,7 +5167,7 @@
           <p:cNvPr id="3" name="Content Placeholder 2">
             <a:extLst>
               <a:ext uri="{FF2B5EF4-FFF2-40B4-BE49-F238E27FC236}">
-                <a16:creationId xmlns="" xmlns:a16="http://schemas.microsoft.com/office/drawing/2014/main" id="{6A72A235-C304-3647-A30E-FF07507C5DB5}"/>
+                <a16:creationId xmlns:a16="http://schemas.microsoft.com/office/drawing/2014/main" id="{6A72A235-C304-3647-A30E-FF07507C5DB5}"/>
               </a:ext>
             </a:extLst>
           </p:cNvPr>
@@ -5262,7 +5290,7 @@
           <p:cNvPr id="2" name="Title 1">
             <a:extLst>
               <a:ext uri="{FF2B5EF4-FFF2-40B4-BE49-F238E27FC236}">
-                <a16:creationId xmlns="" xmlns:a16="http://schemas.microsoft.com/office/drawing/2014/main" id="{7A9724EC-9390-9145-B540-49845CDCDD92}"/>
+                <a16:creationId xmlns:a16="http://schemas.microsoft.com/office/drawing/2014/main" id="{7A9724EC-9390-9145-B540-49845CDCDD92}"/>
               </a:ext>
             </a:extLst>
           </p:cNvPr>
@@ -5290,7 +5318,7 @@
           <p:cNvPr id="3" name="Content Placeholder 2">
             <a:extLst>
               <a:ext uri="{FF2B5EF4-FFF2-40B4-BE49-F238E27FC236}">
-                <a16:creationId xmlns="" xmlns:a16="http://schemas.microsoft.com/office/drawing/2014/main" id="{6A72A235-C304-3647-A30E-FF07507C5DB5}"/>
+                <a16:creationId xmlns:a16="http://schemas.microsoft.com/office/drawing/2014/main" id="{6A72A235-C304-3647-A30E-FF07507C5DB5}"/>
               </a:ext>
             </a:extLst>
           </p:cNvPr>
@@ -5324,33 +5352,21 @@
             <a:pPr lvl="1"/>
             <a:r>
               <a:rPr lang="en-US" dirty="0"/>
-              <a:t>May include </a:t>
-            </a:r>
-            <a:r>
-              <a:rPr lang="en-US" dirty="0" smtClean="0"/>
-              <a:t>identities during the process;</a:t>
+              <a:t>May include identities during the process;</a:t>
             </a:r>
           </a:p>
           <a:p>
             <a:pPr lvl="2"/>
             <a:r>
-              <a:rPr lang="en-US" dirty="0" smtClean="0"/>
-              <a:t>or </a:t>
-            </a:r>
-            <a:r>
-              <a:rPr lang="en-US" dirty="0"/>
-              <a:t>be established as a Post-publication peer review: reviews after publication in a public open forum</a:t>
-            </a:r>
-          </a:p>
-          <a:p>
-            <a:pPr lvl="1"/>
-            <a:r>
-              <a:rPr lang="en-US" dirty="0" smtClean="0"/>
-              <a:t>Pros</a:t>
-            </a:r>
-            <a:r>
-              <a:rPr lang="en-US" dirty="0"/>
-              <a:t>:</a:t>
+              <a:rPr lang="en-US" dirty="0"/>
+              <a:t>or be established as a Post-publication peer review: reviews after publication in a public open forum</a:t>
+            </a:r>
+          </a:p>
+          <a:p>
+            <a:pPr lvl="1"/>
+            <a:r>
+              <a:rPr lang="en-US" dirty="0"/>
+              <a:t>Pros:</a:t>
             </a:r>
           </a:p>
           <a:p>
@@ -5364,13 +5380,8 @@
             <a:pPr lvl="2"/>
             <a:r>
               <a:rPr lang="en-US" dirty="0"/>
-              <a:t>Reviewers are more </a:t>
-            </a:r>
-            <a:r>
-              <a:rPr lang="en-US" dirty="0" smtClean="0"/>
-              <a:t>rigorous</a:t>
-            </a:r>
-            <a:endParaRPr lang="en-US" dirty="0"/>
+              <a:t>Reviewers are more rigorous</a:t>
+            </a:r>
           </a:p>
           <a:p>
             <a:pPr lvl="1"/>
@@ -5451,7 +5462,7 @@
           <p:cNvPr id="2" name="Title 1">
             <a:extLst>
               <a:ext uri="{FF2B5EF4-FFF2-40B4-BE49-F238E27FC236}">
-                <a16:creationId xmlns="" xmlns:a16="http://schemas.microsoft.com/office/drawing/2014/main" id="{7A9724EC-9390-9145-B540-49845CDCDD92}"/>
+                <a16:creationId xmlns:a16="http://schemas.microsoft.com/office/drawing/2014/main" id="{7A9724EC-9390-9145-B540-49845CDCDD92}"/>
               </a:ext>
             </a:extLst>
           </p:cNvPr>
@@ -5479,7 +5490,7 @@
           <p:cNvPr id="3" name="Content Placeholder 2">
             <a:extLst>
               <a:ext uri="{FF2B5EF4-FFF2-40B4-BE49-F238E27FC236}">
-                <a16:creationId xmlns="" xmlns:a16="http://schemas.microsoft.com/office/drawing/2014/main" id="{6A72A235-C304-3647-A30E-FF07507C5DB5}"/>
+                <a16:creationId xmlns:a16="http://schemas.microsoft.com/office/drawing/2014/main" id="{6A72A235-C304-3647-A30E-FF07507C5DB5}"/>
               </a:ext>
             </a:extLst>
           </p:cNvPr>
@@ -5646,7 +5657,7 @@
           <p:cNvPr id="2" name="Title 1">
             <a:extLst>
               <a:ext uri="{FF2B5EF4-FFF2-40B4-BE49-F238E27FC236}">
-                <a16:creationId xmlns="" xmlns:a16="http://schemas.microsoft.com/office/drawing/2014/main" id="{4247AADA-0595-7E47-AA9C-2D10E53F61E8}"/>
+                <a16:creationId xmlns:a16="http://schemas.microsoft.com/office/drawing/2014/main" id="{4247AADA-0595-7E47-AA9C-2D10E53F61E8}"/>
               </a:ext>
             </a:extLst>
           </p:cNvPr>
@@ -5674,7 +5685,7 @@
           <p:cNvPr id="3" name="Content Placeholder 2">
             <a:extLst>
               <a:ext uri="{FF2B5EF4-FFF2-40B4-BE49-F238E27FC236}">
-                <a16:creationId xmlns="" xmlns:a16="http://schemas.microsoft.com/office/drawing/2014/main" id="{80C93237-A2CC-7946-B3D0-82AD8B94F165}"/>
+                <a16:creationId xmlns:a16="http://schemas.microsoft.com/office/drawing/2014/main" id="{80C93237-A2CC-7946-B3D0-82AD8B94F165}"/>
               </a:ext>
             </a:extLst>
           </p:cNvPr>

</xml_diff>